<commit_message>
changed dev environ slide
replaced the charts to make it more readable
</commit_message>
<xml_diff>
--- a/04Presentation/Data607_Project3_Data_Science_Skills.pptx
+++ b/04Presentation/Data607_Project3_Data_Science_Skills.pptx
@@ -5,7 +5,7 @@
     <p:sldMasterId id="2147483650" r:id="rId1"/>
   </p:sldMasterIdLst>
   <p:notesMasterIdLst>
-    <p:notesMasterId r:id="rId13"/>
+    <p:notesMasterId r:id="rId14"/>
   </p:notesMasterIdLst>
   <p:sldIdLst>
     <p:sldId id="256" r:id="rId2"/>
@@ -14,28 +14,29 @@
     <p:sldId id="259" r:id="rId5"/>
     <p:sldId id="266" r:id="rId6"/>
     <p:sldId id="265" r:id="rId7"/>
-    <p:sldId id="260" r:id="rId8"/>
-    <p:sldId id="261" r:id="rId9"/>
-    <p:sldId id="262" r:id="rId10"/>
-    <p:sldId id="263" r:id="rId11"/>
-    <p:sldId id="264" r:id="rId12"/>
+    <p:sldId id="267" r:id="rId8"/>
+    <p:sldId id="260" r:id="rId9"/>
+    <p:sldId id="261" r:id="rId10"/>
+    <p:sldId id="262" r:id="rId11"/>
+    <p:sldId id="263" r:id="rId12"/>
+    <p:sldId id="264" r:id="rId13"/>
   </p:sldIdLst>
   <p:sldSz cx="9144000" cy="5143500" type="screen16x9"/>
   <p:notesSz cx="6858000" cy="9144000"/>
   <p:embeddedFontLst>
     <p:embeddedFont>
       <p:font typeface="Roboto" panose="020B0604020202020204" charset="0"/>
-      <p:regular r:id="rId14"/>
-      <p:bold r:id="rId15"/>
-      <p:italic r:id="rId16"/>
-      <p:boldItalic r:id="rId17"/>
+      <p:regular r:id="rId15"/>
+      <p:bold r:id="rId16"/>
+      <p:italic r:id="rId17"/>
+      <p:boldItalic r:id="rId18"/>
     </p:embeddedFont>
     <p:embeddedFont>
       <p:font typeface="Roboto Light" panose="020B0604020202020204" charset="0"/>
-      <p:regular r:id="rId18"/>
-      <p:bold r:id="rId19"/>
-      <p:italic r:id="rId20"/>
-      <p:boldItalic r:id="rId21"/>
+      <p:regular r:id="rId19"/>
+      <p:bold r:id="rId20"/>
+      <p:italic r:id="rId21"/>
+      <p:boldItalic r:id="rId22"/>
     </p:embeddedFont>
   </p:embeddedFontLst>
   <p:defaultTextStyle>
@@ -1114,6 +1115,138 @@
     </p:spTree>
     <p:extLst>
       <p:ext uri="{BB962C8B-B14F-4D97-AF65-F5344CB8AC3E}">
+        <p14:creationId xmlns:p14="http://schemas.microsoft.com/office/powerpoint/2010/main" val="2155323029"/>
+      </p:ext>
+    </p:extLst>
+  </p:cSld>
+  <p:clrMapOvr>
+    <a:masterClrMapping/>
+  </p:clrMapOvr>
+</p:notes>
+</file>
+
+<file path=ppt/notesSlides/notesSlide11.xml><?xml version="1.0" encoding="utf-8"?>
+<p:notes xmlns:a="http://schemas.openxmlformats.org/drawingml/2006/main" xmlns:r="http://schemas.openxmlformats.org/officeDocument/2006/relationships" xmlns:p="http://schemas.openxmlformats.org/presentationml/2006/main" showMasterSp="0" showMasterPhAnim="0">
+  <p:cSld>
+    <p:spTree>
+      <p:nvGrpSpPr>
+        <p:cNvPr id="1" name="Shape 33"/>
+        <p:cNvGrpSpPr/>
+        <p:nvPr/>
+      </p:nvGrpSpPr>
+      <p:grpSpPr>
+        <a:xfrm>
+          <a:off x="0" y="0"/>
+          <a:ext cx="0" cy="0"/>
+          <a:chOff x="0" y="0"/>
+          <a:chExt cx="0" cy="0"/>
+        </a:xfrm>
+      </p:grpSpPr>
+      <p:sp>
+        <p:nvSpPr>
+          <p:cNvPr id="34" name="Google Shape;34;p3:notes"/>
+          <p:cNvSpPr>
+            <a:spLocks noGrp="1" noRot="1" noChangeAspect="1"/>
+          </p:cNvSpPr>
+          <p:nvPr>
+            <p:ph type="sldImg" idx="2"/>
+          </p:nvPr>
+        </p:nvSpPr>
+        <p:spPr>
+          <a:xfrm>
+            <a:off x="381000" y="685800"/>
+            <a:ext cx="6096000" cy="3429000"/>
+          </a:xfrm>
+          <a:custGeom>
+            <a:avLst/>
+            <a:gdLst/>
+            <a:ahLst/>
+            <a:cxnLst/>
+            <a:rect l="l" t="t" r="r" b="b"/>
+            <a:pathLst>
+              <a:path w="120000" h="120000" extrusionOk="0">
+                <a:moveTo>
+                  <a:pt x="0" y="0"/>
+                </a:moveTo>
+                <a:lnTo>
+                  <a:pt x="120000" y="0"/>
+                </a:lnTo>
+                <a:lnTo>
+                  <a:pt x="120000" y="120000"/>
+                </a:lnTo>
+                <a:lnTo>
+                  <a:pt x="0" y="120000"/>
+                </a:lnTo>
+                <a:close/>
+              </a:path>
+            </a:pathLst>
+          </a:custGeom>
+          <a:noFill/>
+          <a:ln w="9525" cap="flat" cmpd="sng">
+            <a:solidFill>
+              <a:srgbClr val="000000"/>
+            </a:solidFill>
+            <a:prstDash val="solid"/>
+            <a:round/>
+            <a:headEnd type="none" w="sm" len="sm"/>
+            <a:tailEnd type="none" w="sm" len="sm"/>
+          </a:ln>
+        </p:spPr>
+      </p:sp>
+      <p:sp>
+        <p:nvSpPr>
+          <p:cNvPr id="35" name="Google Shape;35;p3:notes"/>
+          <p:cNvSpPr txBox="1">
+            <a:spLocks noGrp="1"/>
+          </p:cNvSpPr>
+          <p:nvPr>
+            <p:ph type="body" idx="1"/>
+          </p:nvPr>
+        </p:nvSpPr>
+        <p:spPr>
+          <a:xfrm>
+            <a:off x="685800" y="4343400"/>
+            <a:ext cx="5486400" cy="4114800"/>
+          </a:xfrm>
+          <a:prstGeom prst="rect">
+            <a:avLst/>
+          </a:prstGeom>
+          <a:noFill/>
+          <a:ln>
+            <a:noFill/>
+          </a:ln>
+        </p:spPr>
+        <p:txBody>
+          <a:bodyPr spcFirstLastPara="1" wrap="square" lIns="91425" tIns="91425" rIns="91425" bIns="91425" anchor="t" anchorCtr="0">
+            <a:noAutofit/>
+          </a:bodyPr>
+          <a:lstStyle/>
+          <a:p>
+            <a:pPr marL="0" lvl="0" indent="0" algn="l" rtl="0">
+              <a:lnSpc>
+                <a:spcPct val="100000"/>
+              </a:lnSpc>
+              <a:spcBef>
+                <a:spcPts val="0"/>
+              </a:spcBef>
+              <a:spcAft>
+                <a:spcPts val="0"/>
+              </a:spcAft>
+              <a:buSzPts val="1100"/>
+              <a:buNone/>
+            </a:pPr>
+            <a:endParaRPr sz="1000">
+              <a:latin typeface="Arial"/>
+              <a:ea typeface="Arial"/>
+              <a:cs typeface="Arial"/>
+              <a:sym typeface="Arial"/>
+            </a:endParaRPr>
+          </a:p>
+        </p:txBody>
+      </p:sp>
+    </p:spTree>
+    <p:extLst>
+      <p:ext uri="{BB962C8B-B14F-4D97-AF65-F5344CB8AC3E}">
         <p14:creationId xmlns:p14="http://schemas.microsoft.com/office/powerpoint/2010/main" val="1542618341"/>
       </p:ext>
     </p:extLst>
@@ -1124,7 +1257,7 @@
 </p:notes>
 </file>
 
-<file path=ppt/notesSlides/notesSlide11.xml><?xml version="1.0" encoding="utf-8"?>
+<file path=ppt/notesSlides/notesSlide12.xml><?xml version="1.0" encoding="utf-8"?>
 <p:notes xmlns:a="http://schemas.openxmlformats.org/drawingml/2006/main" xmlns:r="http://schemas.openxmlformats.org/officeDocument/2006/relationships" xmlns:p="http://schemas.openxmlformats.org/presentationml/2006/main" showMasterSp="0" showMasterPhAnim="0">
   <p:cSld>
     <p:spTree>
@@ -2028,7 +2161,7 @@
     </p:spTree>
     <p:extLst>
       <p:ext uri="{BB962C8B-B14F-4D97-AF65-F5344CB8AC3E}">
-        <p14:creationId xmlns:p14="http://schemas.microsoft.com/office/powerpoint/2010/main" val="1593809012"/>
+        <p14:creationId xmlns:p14="http://schemas.microsoft.com/office/powerpoint/2010/main" val="1612583686"/>
       </p:ext>
     </p:extLst>
   </p:cSld>
@@ -2160,7 +2293,7 @@
     </p:spTree>
     <p:extLst>
       <p:ext uri="{BB962C8B-B14F-4D97-AF65-F5344CB8AC3E}">
-        <p14:creationId xmlns:p14="http://schemas.microsoft.com/office/powerpoint/2010/main" val="1371814782"/>
+        <p14:creationId xmlns:p14="http://schemas.microsoft.com/office/powerpoint/2010/main" val="1593809012"/>
       </p:ext>
     </p:extLst>
   </p:cSld>
@@ -2292,7 +2425,7 @@
     </p:spTree>
     <p:extLst>
       <p:ext uri="{BB962C8B-B14F-4D97-AF65-F5344CB8AC3E}">
-        <p14:creationId xmlns:p14="http://schemas.microsoft.com/office/powerpoint/2010/main" val="2155323029"/>
+        <p14:creationId xmlns:p14="http://schemas.microsoft.com/office/powerpoint/2010/main" val="1371814782"/>
       </p:ext>
     </p:extLst>
   </p:cSld>
@@ -3732,6 +3865,177 @@
         <p:spPr>
           <a:xfrm>
             <a:off x="339375" y="402844"/>
+            <a:ext cx="3739011" cy="403200"/>
+          </a:xfrm>
+          <a:prstGeom prst="rect">
+            <a:avLst/>
+          </a:prstGeom>
+          <a:noFill/>
+          <a:ln>
+            <a:noFill/>
+          </a:ln>
+        </p:spPr>
+        <p:txBody>
+          <a:bodyPr spcFirstLastPara="1" wrap="square" lIns="91425" tIns="91425" rIns="91425" bIns="91425" anchor="t" anchorCtr="0">
+            <a:noAutofit/>
+          </a:bodyPr>
+          <a:lstStyle/>
+          <a:p>
+            <a:pPr marL="0" marR="0" lvl="0" indent="0" algn="l" rtl="0">
+              <a:lnSpc>
+                <a:spcPct val="100000"/>
+              </a:lnSpc>
+              <a:spcBef>
+                <a:spcPts val="0"/>
+              </a:spcBef>
+              <a:spcAft>
+                <a:spcPts val="0"/>
+              </a:spcAft>
+              <a:buClr>
+                <a:srgbClr val="000000"/>
+              </a:buClr>
+              <a:buSzPts val="2400"/>
+              <a:buFont typeface="Arial"/>
+              <a:buNone/>
+            </a:pPr>
+            <a:r>
+              <a:rPr lang="en-US" sz="2400" b="0" i="0" u="none" strike="noStrike" cap="none" dirty="0">
+                <a:solidFill>
+                  <a:srgbClr val="002060"/>
+                </a:solidFill>
+                <a:latin typeface="Roboto"/>
+                <a:ea typeface="Roboto"/>
+                <a:cs typeface="Roboto"/>
+                <a:sym typeface="Roboto"/>
+              </a:rPr>
+              <a:t>Web Frames</a:t>
+            </a:r>
+            <a:endParaRPr sz="2400" b="0" i="0" u="none" strike="noStrike" cap="none" dirty="0">
+              <a:solidFill>
+                <a:srgbClr val="002060"/>
+              </a:solidFill>
+              <a:latin typeface="Roboto"/>
+              <a:ea typeface="Roboto"/>
+              <a:cs typeface="Roboto"/>
+              <a:sym typeface="Roboto"/>
+            </a:endParaRPr>
+          </a:p>
+        </p:txBody>
+      </p:sp>
+      <p:pic>
+        <p:nvPicPr>
+          <p:cNvPr id="3" name="Picture 2" descr="A picture containing computer&#10;&#10;Description automatically generated">
+            <a:extLst>
+              <a:ext uri="{FF2B5EF4-FFF2-40B4-BE49-F238E27FC236}">
+                <a16:creationId xmlns:a16="http://schemas.microsoft.com/office/drawing/2014/main" id="{3796BA11-0C61-4DEB-9308-4BCCBBE324D4}"/>
+              </a:ext>
+            </a:extLst>
+          </p:cNvPr>
+          <p:cNvPicPr>
+            <a:picLocks noChangeAspect="1"/>
+          </p:cNvPicPr>
+          <p:nvPr/>
+        </p:nvPicPr>
+        <p:blipFill>
+          <a:blip r:embed="rId3"/>
+          <a:stretch>
+            <a:fillRect/>
+          </a:stretch>
+        </p:blipFill>
+        <p:spPr>
+          <a:xfrm>
+            <a:off x="786420" y="1467650"/>
+            <a:ext cx="7306235" cy="3471930"/>
+          </a:xfrm>
+          <a:prstGeom prst="rect">
+            <a:avLst/>
+          </a:prstGeom>
+        </p:spPr>
+      </p:pic>
+      <p:sp>
+        <p:nvSpPr>
+          <p:cNvPr id="4" name="TextBox 3">
+            <a:extLst>
+              <a:ext uri="{FF2B5EF4-FFF2-40B4-BE49-F238E27FC236}">
+                <a16:creationId xmlns:a16="http://schemas.microsoft.com/office/drawing/2014/main" id="{7F948D9D-C39E-413E-B715-8810159EFD38}"/>
+              </a:ext>
+            </a:extLst>
+          </p:cNvPr>
+          <p:cNvSpPr txBox="1"/>
+          <p:nvPr/>
+        </p:nvSpPr>
+        <p:spPr>
+          <a:xfrm>
+            <a:off x="3004457" y="1045029"/>
+            <a:ext cx="3042877" cy="307777"/>
+          </a:xfrm>
+          <a:prstGeom prst="rect">
+            <a:avLst/>
+          </a:prstGeom>
+          <a:noFill/>
+        </p:spPr>
+        <p:txBody>
+          <a:bodyPr wrap="square" rtlCol="0">
+            <a:spAutoFit/>
+          </a:bodyPr>
+          <a:lstStyle/>
+          <a:p>
+            <a:r>
+              <a:rPr lang="en-US" b="1" dirty="0">
+                <a:solidFill>
+                  <a:srgbClr val="002060"/>
+                </a:solidFill>
+                <a:latin typeface="Roboto" panose="020B0604020202020204" charset="0"/>
+                <a:ea typeface="Roboto" panose="020B0604020202020204" charset="0"/>
+              </a:rPr>
+              <a:t>Most Commonly Used Web Frames</a:t>
+            </a:r>
+          </a:p>
+        </p:txBody>
+      </p:sp>
+    </p:spTree>
+    <p:extLst>
+      <p:ext uri="{BB962C8B-B14F-4D97-AF65-F5344CB8AC3E}">
+        <p14:creationId xmlns:p14="http://schemas.microsoft.com/office/powerpoint/2010/main" val="2162362887"/>
+      </p:ext>
+    </p:extLst>
+  </p:cSld>
+  <p:clrMapOvr>
+    <a:masterClrMapping/>
+  </p:clrMapOvr>
+</p:sld>
+</file>
+
+<file path=ppt/slides/slide11.xml><?xml version="1.0" encoding="utf-8"?>
+<p:sld xmlns:a="http://schemas.openxmlformats.org/drawingml/2006/main" xmlns:r="http://schemas.openxmlformats.org/officeDocument/2006/relationships" xmlns:p="http://schemas.openxmlformats.org/presentationml/2006/main">
+  <p:cSld>
+    <p:spTree>
+      <p:nvGrpSpPr>
+        <p:cNvPr id="1" name="Shape 36"/>
+        <p:cNvGrpSpPr/>
+        <p:nvPr/>
+      </p:nvGrpSpPr>
+      <p:grpSpPr>
+        <a:xfrm>
+          <a:off x="0" y="0"/>
+          <a:ext cx="0" cy="0"/>
+          <a:chOff x="0" y="0"/>
+          <a:chExt cx="0" cy="0"/>
+        </a:xfrm>
+      </p:grpSpPr>
+      <p:sp>
+        <p:nvSpPr>
+          <p:cNvPr id="37" name="Google Shape;37;p6"/>
+          <p:cNvSpPr txBox="1">
+            <a:spLocks noGrp="1"/>
+          </p:cNvSpPr>
+          <p:nvPr>
+            <p:ph type="ctrTitle"/>
+          </p:nvPr>
+        </p:nvSpPr>
+        <p:spPr>
+          <a:xfrm>
+            <a:off x="339375" y="402844"/>
             <a:ext cx="4612951" cy="403200"/>
           </a:xfrm>
           <a:prstGeom prst="rect">
@@ -3789,66 +4093,6 @@
           </a:p>
         </p:txBody>
       </p:sp>
-      <p:pic>
-        <p:nvPicPr>
-          <p:cNvPr id="3" name="Picture 2" descr="A picture containing computer, bed&#10;&#10;Description automatically generated">
-            <a:extLst>
-              <a:ext uri="{FF2B5EF4-FFF2-40B4-BE49-F238E27FC236}">
-                <a16:creationId xmlns:a16="http://schemas.microsoft.com/office/drawing/2014/main" id="{C77A7694-FD14-47AB-BF48-84A181F621AE}"/>
-              </a:ext>
-            </a:extLst>
-          </p:cNvPr>
-          <p:cNvPicPr>
-            <a:picLocks noChangeAspect="1"/>
-          </p:cNvPicPr>
-          <p:nvPr/>
-        </p:nvPicPr>
-        <p:blipFill>
-          <a:blip r:embed="rId3"/>
-          <a:stretch>
-            <a:fillRect/>
-          </a:stretch>
-        </p:blipFill>
-        <p:spPr>
-          <a:xfrm>
-            <a:off x="155225" y="1871796"/>
-            <a:ext cx="4310092" cy="2262053"/>
-          </a:xfrm>
-          <a:prstGeom prst="rect">
-            <a:avLst/>
-          </a:prstGeom>
-        </p:spPr>
-      </p:pic>
-      <p:pic>
-        <p:nvPicPr>
-          <p:cNvPr id="5" name="Picture 4" descr="A picture containing computer, table&#10;&#10;Description automatically generated">
-            <a:extLst>
-              <a:ext uri="{FF2B5EF4-FFF2-40B4-BE49-F238E27FC236}">
-                <a16:creationId xmlns:a16="http://schemas.microsoft.com/office/drawing/2014/main" id="{625F0CEE-A823-4753-B826-9E3722AA88DC}"/>
-              </a:ext>
-            </a:extLst>
-          </p:cNvPr>
-          <p:cNvPicPr>
-            <a:picLocks noChangeAspect="1"/>
-          </p:cNvPicPr>
-          <p:nvPr/>
-        </p:nvPicPr>
-        <p:blipFill>
-          <a:blip r:embed="rId4"/>
-          <a:stretch>
-            <a:fillRect/>
-          </a:stretch>
-        </p:blipFill>
-        <p:spPr>
-          <a:xfrm>
-            <a:off x="4572000" y="1871796"/>
-            <a:ext cx="4485430" cy="2456105"/>
-          </a:xfrm>
-          <a:prstGeom prst="rect">
-            <a:avLst/>
-          </a:prstGeom>
-        </p:spPr>
-      </p:pic>
       <p:cxnSp>
         <p:nvCxnSpPr>
           <p:cNvPr id="7" name="Straight Connector 6">
@@ -3863,7 +4107,7 @@
         </p:nvCxnSpPr>
         <p:spPr>
           <a:xfrm>
-            <a:off x="4540250" y="1377950"/>
+            <a:off x="4668005" y="1377950"/>
             <a:ext cx="0" cy="2997200"/>
           </a:xfrm>
           <a:prstGeom prst="line">
@@ -3899,7 +4143,7 @@
         </p:nvSpPr>
         <p:spPr>
           <a:xfrm>
-            <a:off x="1170446" y="1231900"/>
+            <a:off x="1446110" y="1231900"/>
             <a:ext cx="2279650" cy="307777"/>
           </a:xfrm>
           <a:prstGeom prst="rect">
@@ -3967,6 +4211,127 @@
           </a:p>
         </p:txBody>
       </p:sp>
+      <p:pic>
+        <p:nvPicPr>
+          <p:cNvPr id="9" name="Picture 8" descr="A picture containing screenshot&#10;&#10;Description automatically generated">
+            <a:extLst>
+              <a:ext uri="{FF2B5EF4-FFF2-40B4-BE49-F238E27FC236}">
+                <a16:creationId xmlns:a16="http://schemas.microsoft.com/office/drawing/2014/main" id="{5B1BD234-6457-46B5-93D0-2E3488E99FFD}"/>
+              </a:ext>
+            </a:extLst>
+          </p:cNvPr>
+          <p:cNvPicPr>
+            <a:picLocks noChangeAspect="1"/>
+          </p:cNvPicPr>
+          <p:nvPr/>
+        </p:nvPicPr>
+        <p:blipFill>
+          <a:blip r:embed="rId3"/>
+          <a:stretch>
+            <a:fillRect/>
+          </a:stretch>
+        </p:blipFill>
+        <p:spPr>
+          <a:xfrm>
+            <a:off x="5128892" y="1682689"/>
+            <a:ext cx="3374363" cy="2468406"/>
+          </a:xfrm>
+          <a:prstGeom prst="rect">
+            <a:avLst/>
+          </a:prstGeom>
+        </p:spPr>
+      </p:pic>
+      <p:pic>
+        <p:nvPicPr>
+          <p:cNvPr id="12" name="Picture 11" descr="A picture containing screenshot&#10;&#10;Description automatically generated">
+            <a:extLst>
+              <a:ext uri="{FF2B5EF4-FFF2-40B4-BE49-F238E27FC236}">
+                <a16:creationId xmlns:a16="http://schemas.microsoft.com/office/drawing/2014/main" id="{6EB93BC0-6FE5-45EB-A7FD-87860B5DD0D1}"/>
+              </a:ext>
+            </a:extLst>
+          </p:cNvPr>
+          <p:cNvPicPr>
+            <a:picLocks noChangeAspect="1"/>
+          </p:cNvPicPr>
+          <p:nvPr/>
+        </p:nvPicPr>
+        <p:blipFill>
+          <a:blip r:embed="rId4"/>
+          <a:stretch>
+            <a:fillRect/>
+          </a:stretch>
+        </p:blipFill>
+        <p:spPr>
+          <a:xfrm>
+            <a:off x="576227" y="1682688"/>
+            <a:ext cx="3644770" cy="2387723"/>
+          </a:xfrm>
+          <a:prstGeom prst="rect">
+            <a:avLst/>
+          </a:prstGeom>
+        </p:spPr>
+      </p:pic>
+      <p:sp>
+        <p:nvSpPr>
+          <p:cNvPr id="13" name="TextBox 12">
+            <a:extLst>
+              <a:ext uri="{FF2B5EF4-FFF2-40B4-BE49-F238E27FC236}">
+                <a16:creationId xmlns:a16="http://schemas.microsoft.com/office/drawing/2014/main" id="{5A8F8FEF-E12E-4225-BEB1-50C901C975B0}"/>
+              </a:ext>
+            </a:extLst>
+          </p:cNvPr>
+          <p:cNvSpPr txBox="1"/>
+          <p:nvPr/>
+        </p:nvSpPr>
+        <p:spPr>
+          <a:xfrm>
+            <a:off x="1956547" y="4485111"/>
+            <a:ext cx="5230906" cy="307777"/>
+          </a:xfrm>
+          <a:prstGeom prst="rect">
+            <a:avLst/>
+          </a:prstGeom>
+          <a:noFill/>
+        </p:spPr>
+        <p:txBody>
+          <a:bodyPr wrap="square" rtlCol="0">
+            <a:spAutoFit/>
+          </a:bodyPr>
+          <a:lstStyle/>
+          <a:p>
+            <a:r>
+              <a:rPr lang="en-US" dirty="0">
+                <a:solidFill>
+                  <a:srgbClr val="002060"/>
+                </a:solidFill>
+                <a:latin typeface="Roboto" panose="020B0604020202020204" charset="0"/>
+                <a:ea typeface="Roboto" panose="020B0604020202020204" charset="0"/>
+              </a:rPr>
+              <a:t>Note: RStudio was the 12</a:t>
+            </a:r>
+            <a:r>
+              <a:rPr lang="en-US" baseline="30000" dirty="0">
+                <a:solidFill>
+                  <a:srgbClr val="002060"/>
+                </a:solidFill>
+                <a:latin typeface="Roboto" panose="020B0604020202020204" charset="0"/>
+                <a:ea typeface="Roboto" panose="020B0604020202020204" charset="0"/>
+              </a:rPr>
+              <a:t>th</a:t>
+            </a:r>
+            <a:r>
+              <a:rPr lang="en-US" dirty="0">
+                <a:solidFill>
+                  <a:srgbClr val="002060"/>
+                </a:solidFill>
+                <a:latin typeface="Roboto" panose="020B0604020202020204" charset="0"/>
+                <a:ea typeface="Roboto" panose="020B0604020202020204" charset="0"/>
+              </a:rPr>
+              <a:t> most popular environment overall</a:t>
+            </a:r>
+          </a:p>
+        </p:txBody>
+      </p:sp>
     </p:spTree>
     <p:extLst>
       <p:ext uri="{BB962C8B-B14F-4D97-AF65-F5344CB8AC3E}">
@@ -3980,7 +4345,7 @@
 </p:sld>
 </file>
 
-<file path=ppt/slides/slide11.xml><?xml version="1.0" encoding="utf-8"?>
+<file path=ppt/slides/slide12.xml><?xml version="1.0" encoding="utf-8"?>
 <p:sld xmlns:a="http://schemas.openxmlformats.org/drawingml/2006/main" xmlns:r="http://schemas.openxmlformats.org/officeDocument/2006/relationships" xmlns:p="http://schemas.openxmlformats.org/presentationml/2006/main">
   <p:cSld>
     <p:spTree>
@@ -4126,7 +4491,7 @@
           <a:lstStyle/>
           <a:p>
             <a:r>
-              <a:rPr lang="en-US" dirty="0">
+              <a:rPr lang="en-US" b="1" dirty="0">
                 <a:solidFill>
                   <a:srgbClr val="002060"/>
                 </a:solidFill>
@@ -7534,6 +7899,83 @@
           </a:p>
         </p:txBody>
       </p:sp>
+      <p:pic>
+        <p:nvPicPr>
+          <p:cNvPr id="2" name="Picture 2" descr="A screenshot of a cell phone&#10;&#10;Description generated with very high confidence">
+            <a:extLst>
+              <a:ext uri="{FF2B5EF4-FFF2-40B4-BE49-F238E27FC236}">
+                <a16:creationId xmlns:a16="http://schemas.microsoft.com/office/drawing/2014/main" id="{F329B3F0-1EAF-4DF6-960E-B1F6F6678295}"/>
+              </a:ext>
+            </a:extLst>
+          </p:cNvPr>
+          <p:cNvPicPr>
+            <a:picLocks noChangeAspect="1"/>
+          </p:cNvPicPr>
+          <p:nvPr/>
+        </p:nvPicPr>
+        <p:blipFill rotWithShape="1">
+          <a:blip r:embed="rId3"/>
+          <a:srcRect l="3306" r="165" b="13137"/>
+          <a:stretch/>
+        </p:blipFill>
+        <p:spPr>
+          <a:xfrm>
+            <a:off x="1730829" y="1389634"/>
+            <a:ext cx="5782327" cy="3216203"/>
+          </a:xfrm>
+          <a:prstGeom prst="rect">
+            <a:avLst/>
+          </a:prstGeom>
+        </p:spPr>
+      </p:pic>
+      <p:sp>
+        <p:nvSpPr>
+          <p:cNvPr id="4" name="TextBox 3">
+            <a:extLst>
+              <a:ext uri="{FF2B5EF4-FFF2-40B4-BE49-F238E27FC236}">
+                <a16:creationId xmlns:a16="http://schemas.microsoft.com/office/drawing/2014/main" id="{9A7EB2B7-5145-45EE-8FF3-B8C9B482ACD5}"/>
+              </a:ext>
+            </a:extLst>
+          </p:cNvPr>
+          <p:cNvSpPr txBox="1"/>
+          <p:nvPr/>
+        </p:nvSpPr>
+        <p:spPr>
+          <a:xfrm>
+            <a:off x="3004457" y="1045029"/>
+            <a:ext cx="3042877" cy="307777"/>
+          </a:xfrm>
+          <a:prstGeom prst="rect">
+            <a:avLst/>
+          </a:prstGeom>
+          <a:noFill/>
+        </p:spPr>
+        <p:txBody>
+          <a:bodyPr wrap="square" rtlCol="0" anchor="t">
+            <a:spAutoFit/>
+          </a:bodyPr>
+          <a:lstStyle/>
+          <a:p>
+            <a:r>
+              <a:rPr lang="en-US" b="1" dirty="0">
+                <a:solidFill>
+                  <a:srgbClr val="002060"/>
+                </a:solidFill>
+                <a:latin typeface="Roboto"/>
+                <a:ea typeface="Roboto"/>
+              </a:rPr>
+              <a:t>Most Commonly Used Languages</a:t>
+            </a:r>
+            <a:endParaRPr lang="en-US" b="1" dirty="0">
+              <a:solidFill>
+                <a:srgbClr val="002060"/>
+              </a:solidFill>
+              <a:latin typeface="Roboto" panose="020B0604020202020204" charset="0"/>
+              <a:ea typeface="Roboto" panose="020B0604020202020204" charset="0"/>
+            </a:endParaRPr>
+          </a:p>
+        </p:txBody>
+      </p:sp>
     </p:spTree>
     <p:extLst>
       <p:ext uri="{BB962C8B-B14F-4D97-AF65-F5344CB8AC3E}">
@@ -7620,7 +8062,7 @@
                 <a:cs typeface="Roboto"/>
                 <a:sym typeface="Roboto"/>
               </a:rPr>
-              <a:t>Databases</a:t>
+              <a:t>Languages</a:t>
             </a:r>
             <a:endParaRPr sz="2400" b="0" i="0" u="none" strike="noStrike" cap="none" dirty="0">
               <a:solidFill>
@@ -7634,10 +8076,81 @@
           </a:p>
         </p:txBody>
       </p:sp>
+      <p:pic>
+        <p:nvPicPr>
+          <p:cNvPr id="4" name="Picture 4" descr="A close up of text on a white background&#10;&#10;Description generated with very high confidence">
+            <a:extLst>
+              <a:ext uri="{FF2B5EF4-FFF2-40B4-BE49-F238E27FC236}">
+                <a16:creationId xmlns:a16="http://schemas.microsoft.com/office/drawing/2014/main" id="{71323657-6C5B-41D0-B6E3-EF41786D4C0E}"/>
+              </a:ext>
+            </a:extLst>
+          </p:cNvPr>
+          <p:cNvPicPr>
+            <a:picLocks noChangeAspect="1"/>
+          </p:cNvPicPr>
+          <p:nvPr/>
+        </p:nvPicPr>
+        <p:blipFill rotWithShape="1">
+          <a:blip r:embed="rId3"/>
+          <a:srcRect l="4290" r="330" b="16667"/>
+          <a:stretch/>
+        </p:blipFill>
+        <p:spPr>
+          <a:xfrm>
+            <a:off x="1250043" y="1589205"/>
+            <a:ext cx="5718882" cy="3089004"/>
+          </a:xfrm>
+          <a:prstGeom prst="rect">
+            <a:avLst/>
+          </a:prstGeom>
+        </p:spPr>
+      </p:pic>
+      <p:sp>
+        <p:nvSpPr>
+          <p:cNvPr id="10" name="TextBox 9">
+            <a:extLst>
+              <a:ext uri="{FF2B5EF4-FFF2-40B4-BE49-F238E27FC236}">
+                <a16:creationId xmlns:a16="http://schemas.microsoft.com/office/drawing/2014/main" id="{04B7E099-3349-490C-A236-CF1A451C9E42}"/>
+              </a:ext>
+            </a:extLst>
+          </p:cNvPr>
+          <p:cNvSpPr txBox="1"/>
+          <p:nvPr/>
+        </p:nvSpPr>
+        <p:spPr>
+          <a:xfrm>
+            <a:off x="3004457" y="1045029"/>
+            <a:ext cx="3042877" cy="307777"/>
+          </a:xfrm>
+          <a:prstGeom prst="rect">
+            <a:avLst/>
+          </a:prstGeom>
+          <a:noFill/>
+        </p:spPr>
+        <p:txBody>
+          <a:bodyPr wrap="square" rtlCol="0" anchor="t">
+            <a:spAutoFit/>
+          </a:bodyPr>
+          <a:lstStyle/>
+          <a:p>
+            <a:r>
+              <a:rPr lang="en-US" b="1" dirty="0">
+                <a:solidFill>
+                  <a:srgbClr val="002060"/>
+                </a:solidFill>
+                <a:latin typeface="Roboto"/>
+                <a:ea typeface="Roboto"/>
+              </a:rPr>
+              <a:t>#1 Preference for Language</a:t>
+            </a:r>
+            <a:endParaRPr lang="en-US" dirty="0"/>
+          </a:p>
+        </p:txBody>
+      </p:sp>
     </p:spTree>
     <p:extLst>
       <p:ext uri="{BB962C8B-B14F-4D97-AF65-F5344CB8AC3E}">
-        <p14:creationId xmlns:p14="http://schemas.microsoft.com/office/powerpoint/2010/main" val="979059576"/>
+        <p14:creationId xmlns:p14="http://schemas.microsoft.com/office/powerpoint/2010/main" val="344569103"/>
       </p:ext>
     </p:extLst>
   </p:cSld>
@@ -7720,7 +8233,7 @@
                 <a:cs typeface="Roboto"/>
                 <a:sym typeface="Roboto"/>
               </a:rPr>
-              <a:t>Platforms</a:t>
+              <a:t>Databases</a:t>
             </a:r>
             <a:endParaRPr sz="2400" b="0" i="0" u="none" strike="noStrike" cap="none" dirty="0">
               <a:solidFill>
@@ -7734,10 +8247,87 @@
           </a:p>
         </p:txBody>
       </p:sp>
+      <p:pic>
+        <p:nvPicPr>
+          <p:cNvPr id="2" name="Picture 2" descr="A screenshot of a cell phone&#10;&#10;Description generated with very high confidence">
+            <a:extLst>
+              <a:ext uri="{FF2B5EF4-FFF2-40B4-BE49-F238E27FC236}">
+                <a16:creationId xmlns:a16="http://schemas.microsoft.com/office/drawing/2014/main" id="{EAD16098-C4AA-4895-A991-DD0FBBCCFEFA}"/>
+              </a:ext>
+            </a:extLst>
+          </p:cNvPr>
+          <p:cNvPicPr>
+            <a:picLocks noChangeAspect="1"/>
+          </p:cNvPicPr>
+          <p:nvPr/>
+        </p:nvPicPr>
+        <p:blipFill rotWithShape="1">
+          <a:blip r:embed="rId3"/>
+          <a:srcRect l="3630" r="330" b="9140"/>
+          <a:stretch/>
+        </p:blipFill>
+        <p:spPr>
+          <a:xfrm>
+            <a:off x="1458686" y="1543848"/>
+            <a:ext cx="5628134" cy="3298073"/>
+          </a:xfrm>
+          <a:prstGeom prst="rect">
+            <a:avLst/>
+          </a:prstGeom>
+        </p:spPr>
+      </p:pic>
+      <p:sp>
+        <p:nvSpPr>
+          <p:cNvPr id="4" name="TextBox 3">
+            <a:extLst>
+              <a:ext uri="{FF2B5EF4-FFF2-40B4-BE49-F238E27FC236}">
+                <a16:creationId xmlns:a16="http://schemas.microsoft.com/office/drawing/2014/main" id="{5762AB9A-24A3-4F83-8827-ECD6D7B4A6AB}"/>
+              </a:ext>
+            </a:extLst>
+          </p:cNvPr>
+          <p:cNvSpPr txBox="1"/>
+          <p:nvPr/>
+        </p:nvSpPr>
+        <p:spPr>
+          <a:xfrm>
+            <a:off x="3004457" y="1045029"/>
+            <a:ext cx="3042877" cy="307777"/>
+          </a:xfrm>
+          <a:prstGeom prst="rect">
+            <a:avLst/>
+          </a:prstGeom>
+          <a:noFill/>
+        </p:spPr>
+        <p:txBody>
+          <a:bodyPr wrap="square" rtlCol="0" anchor="t">
+            <a:spAutoFit/>
+          </a:bodyPr>
+          <a:lstStyle/>
+          <a:p>
+            <a:r>
+              <a:rPr lang="en-US" b="1" dirty="0">
+                <a:solidFill>
+                  <a:srgbClr val="002060"/>
+                </a:solidFill>
+                <a:latin typeface="Roboto"/>
+                <a:ea typeface="Roboto"/>
+              </a:rPr>
+              <a:t>Most Commonly Used Databases</a:t>
+            </a:r>
+            <a:endParaRPr lang="en-US" b="1" dirty="0">
+              <a:solidFill>
+                <a:srgbClr val="002060"/>
+              </a:solidFill>
+              <a:latin typeface="Roboto" panose="020B0604020202020204" charset="0"/>
+              <a:ea typeface="Roboto" panose="020B0604020202020204" charset="0"/>
+            </a:endParaRPr>
+          </a:p>
+        </p:txBody>
+      </p:sp>
     </p:spTree>
     <p:extLst>
       <p:ext uri="{BB962C8B-B14F-4D97-AF65-F5344CB8AC3E}">
-        <p14:creationId xmlns:p14="http://schemas.microsoft.com/office/powerpoint/2010/main" val="3764457523"/>
+        <p14:creationId xmlns:p14="http://schemas.microsoft.com/office/powerpoint/2010/main" val="979059576"/>
       </p:ext>
     </p:extLst>
   </p:cSld>
@@ -7820,7 +8410,7 @@
                 <a:cs typeface="Roboto"/>
                 <a:sym typeface="Roboto"/>
               </a:rPr>
-              <a:t>Web Frames</a:t>
+              <a:t>Platforms</a:t>
             </a:r>
             <a:endParaRPr sz="2400" b="0" i="0" u="none" strike="noStrike" cap="none" dirty="0">
               <a:solidFill>
@@ -7836,10 +8426,10 @@
       </p:sp>
       <p:pic>
         <p:nvPicPr>
-          <p:cNvPr id="3" name="Picture 2" descr="A picture containing computer&#10;&#10;Description automatically generated">
+          <p:cNvPr id="2" name="Picture 2" descr="A screenshot of a cell phone&#10;&#10;Description generated with very high confidence">
             <a:extLst>
               <a:ext uri="{FF2B5EF4-FFF2-40B4-BE49-F238E27FC236}">
-                <a16:creationId xmlns:a16="http://schemas.microsoft.com/office/drawing/2014/main" id="{3796BA11-0C61-4DEB-9308-4BCCBBE324D4}"/>
+                <a16:creationId xmlns:a16="http://schemas.microsoft.com/office/drawing/2014/main" id="{DE479F39-BB85-405A-AACA-DE216E7862A7}"/>
               </a:ext>
             </a:extLst>
           </p:cNvPr>
@@ -7848,16 +8438,15 @@
           </p:cNvPicPr>
           <p:nvPr/>
         </p:nvPicPr>
-        <p:blipFill>
+        <p:blipFill rotWithShape="1">
           <a:blip r:embed="rId3"/>
-          <a:stretch>
-            <a:fillRect/>
-          </a:stretch>
+          <a:srcRect l="3960" r="330" b="13978"/>
+          <a:stretch/>
         </p:blipFill>
         <p:spPr>
           <a:xfrm>
-            <a:off x="786420" y="1467650"/>
-            <a:ext cx="7306235" cy="3471930"/>
+            <a:off x="1059543" y="1425920"/>
+            <a:ext cx="6335723" cy="3524584"/>
           </a:xfrm>
           <a:prstGeom prst="rect">
             <a:avLst/>
@@ -7869,7 +8458,7 @@
           <p:cNvPr id="4" name="TextBox 3">
             <a:extLst>
               <a:ext uri="{FF2B5EF4-FFF2-40B4-BE49-F238E27FC236}">
-                <a16:creationId xmlns:a16="http://schemas.microsoft.com/office/drawing/2014/main" id="{7F948D9D-C39E-413E-B715-8810159EFD38}"/>
+                <a16:creationId xmlns:a16="http://schemas.microsoft.com/office/drawing/2014/main" id="{D00590C0-70A8-427B-9AD4-4BDD44628AB8}"/>
               </a:ext>
             </a:extLst>
           </p:cNvPr>
@@ -7887,7 +8476,7 @@
           <a:noFill/>
         </p:spPr>
         <p:txBody>
-          <a:bodyPr wrap="square" rtlCol="0">
+          <a:bodyPr wrap="square" rtlCol="0" anchor="t">
             <a:spAutoFit/>
           </a:bodyPr>
           <a:lstStyle/>
@@ -7897,18 +8486,25 @@
                 <a:solidFill>
                   <a:srgbClr val="002060"/>
                 </a:solidFill>
-                <a:latin typeface="Roboto" panose="020B0604020202020204" charset="0"/>
-                <a:ea typeface="Roboto" panose="020B0604020202020204" charset="0"/>
+                <a:latin typeface="Roboto"/>
+                <a:ea typeface="Roboto"/>
               </a:rPr>
-              <a:t>Most Commonly Used Web Frames</a:t>
+              <a:t>Most Commonly Used Platforms</a:t>
             </a:r>
+            <a:endParaRPr lang="en-US" b="1" dirty="0">
+              <a:solidFill>
+                <a:srgbClr val="002060"/>
+              </a:solidFill>
+              <a:latin typeface="Roboto" panose="020B0604020202020204" charset="0"/>
+              <a:ea typeface="Roboto" panose="020B0604020202020204" charset="0"/>
+            </a:endParaRPr>
           </a:p>
         </p:txBody>
       </p:sp>
     </p:spTree>
     <p:extLst>
       <p:ext uri="{BB962C8B-B14F-4D97-AF65-F5344CB8AC3E}">
-        <p14:creationId xmlns:p14="http://schemas.microsoft.com/office/powerpoint/2010/main" val="2162362887"/>
+        <p14:creationId xmlns:p14="http://schemas.microsoft.com/office/powerpoint/2010/main" val="3764457523"/>
       </p:ext>
     </p:extLst>
   </p:cSld>

</xml_diff>